<commit_message>
updates materials with code smells
</commit_message>
<xml_diff>
--- a/ODD/materials/part0_intro.pptx
+++ b/ODD/materials/part0_intro.pptx
@@ -544,99 +544,13 @@
             <a:pPr>
               <a:defRPr sz="1100"/>
             </a:pPr>
-            <a:r>
-              <a:rPr dirty="0"/>
-              <a:t>Sounds super dry. But it’s actually quite useful and I’ve added some memes to keep you interested</a:t>
-            </a:r>
+            <a:endParaRPr lang="en-US" dirty="0"/>
           </a:p>
           <a:p>
             <a:pPr>
               <a:defRPr sz="1100"/>
             </a:pPr>
-            <a:endParaRPr dirty="0"/>
-          </a:p>
-          <a:p>
-            <a:pPr>
-              <a:defRPr sz="1100"/>
-            </a:pPr>
-            <a:r>
-              <a:rPr dirty="0"/>
-              <a:t>Also, a goat will die, but don’t worry, it will be re-</a:t>
-            </a:r>
-            <a:r>
-              <a:rPr dirty="0" err="1"/>
-              <a:t>surrected</a:t>
-            </a:r>
-            <a:endParaRPr dirty="0"/>
-          </a:p>
-          <a:p>
-            <a:pPr>
-              <a:defRPr sz="1100"/>
-            </a:pPr>
-            <a:endParaRPr dirty="0"/>
-          </a:p>
-          <a:p>
-            <a:pPr>
-              <a:defRPr sz="1100"/>
-            </a:pPr>
-            <a:endParaRPr dirty="0"/>
-          </a:p>
-          <a:p>
-            <a:pPr>
-              <a:defRPr sz="1100"/>
-            </a:pPr>
-            <a:endParaRPr dirty="0"/>
-          </a:p>
-          <a:p>
-            <a:pPr>
-              <a:defRPr sz="1100"/>
-            </a:pPr>
-            <a:r>
-              <a:rPr dirty="0"/>
-              <a:t>——</a:t>
-            </a:r>
-          </a:p>
-          <a:p>
-            <a:pPr>
-              <a:defRPr sz="1100"/>
-            </a:pPr>
-            <a:r>
-              <a:rPr dirty="0"/>
-              <a:t># ideas for changes</a:t>
-            </a:r>
-          </a:p>
-          <a:p>
-            <a:pPr>
-              <a:defRPr sz="1100"/>
-            </a:pPr>
-            <a:r>
-              <a:rPr dirty="0"/>
-              <a:t>-----------------</a:t>
-            </a:r>
-          </a:p>
-          <a:p>
-            <a:pPr>
-              <a:defRPr sz="1100"/>
-            </a:pPr>
-            <a:r>
-              <a:rPr dirty="0"/>
-              <a:t>- have two slides with different setups (mine + colleague/server/office laptop) aka python versions, package versions</a:t>
-            </a:r>
-          </a:p>
-          <a:p>
-            <a:pPr>
-              <a:defRPr sz="1100"/>
-            </a:pPr>
-            <a:endParaRPr dirty="0"/>
-          </a:p>
-          <a:p>
-            <a:pPr>
-              <a:defRPr sz="1100"/>
-            </a:pPr>
-            <a:r>
-              <a:rPr dirty="0"/>
-              <a:t>- add flake, black, sort</a:t>
-            </a:r>
+            <a:endParaRPr lang="de-DE" dirty="0"/>
           </a:p>
         </p:txBody>
       </p:sp>
@@ -6188,7 +6102,7 @@
         <p:spPr>
           <a:xfrm>
             <a:off x="869150" y="0"/>
-            <a:ext cx="4677211" cy="912373"/>
+            <a:ext cx="3058273" cy="912373"/>
           </a:xfrm>
           <a:prstGeom prst="rect">
             <a:avLst/>
@@ -6207,7 +6121,7 @@
         </p:spPr>
         <p:txBody>
           <a:bodyPr lIns="91424" tIns="91424" rIns="91424" bIns="91424" anchor="t">
-            <a:normAutofit fontScale="90000"/>
+            <a:normAutofit fontScale="97500"/>
           </a:bodyPr>
           <a:lstStyle>
             <a:lvl1pPr marL="0" marR="0" indent="0" algn="l" defTabSz="914400" rtl="0" latinLnBrk="0">
@@ -6449,7 +6363,7 @@
             <a:pPr hangingPunct="1"/>
             <a:r>
               <a:rPr lang="en-US" dirty="0"/>
-              <a:t>How we work today</a:t>
+              <a:t>Limitations</a:t>
             </a:r>
           </a:p>
         </p:txBody>
@@ -6923,71 +6837,32 @@
                 <a:cs typeface="Avenir Heavy"/>
                 <a:sym typeface="Avenir Heavy"/>
               </a:rPr>
-              <a:t>, so one person writes, and one person looks over their shoulder. Feel free to switch even if it is uncomfortable</a:t>
-            </a:r>
-          </a:p>
-          <a:p>
-            <a:pPr marL="1200126" lvl="2" indent="-285750" hangingPunct="1">
-              <a:buFontTx/>
-              <a:buChar char="-"/>
-              <a:defRPr>
+              <a:t>, so one person writes, and one person looks over their shoulder. Feel free to switch, especially if it is </a:t>
+            </a:r>
+            <a:r>
+              <a:rPr lang="en-US">
                 <a:solidFill>
-                  <a:schemeClr val="accent4"/>
+                  <a:srgbClr val="3A81BA"/>
                 </a:solidFill>
                 <a:latin typeface="Avenir Heavy"/>
                 <a:ea typeface="Avenir Heavy"/>
                 <a:cs typeface="Avenir Heavy"/>
                 <a:sym typeface="Avenir Heavy"/>
-              </a:defRPr>
-            </a:pPr>
-            <a:endParaRPr lang="en-US" dirty="0">
-              <a:solidFill>
-                <a:srgbClr val="3A81BA"/>
-              </a:solidFill>
-              <a:latin typeface="Avenir Heavy"/>
-              <a:ea typeface="Avenir Heavy"/>
-              <a:cs typeface="Avenir Heavy"/>
-              <a:sym typeface="Avenir Heavy"/>
-            </a:endParaRPr>
-          </a:p>
-          <a:p>
-            <a:pPr marL="1200126" lvl="2" indent="-285750" hangingPunct="1">
-              <a:buFontTx/>
-              <a:buChar char="-"/>
-              <a:defRPr>
+              </a:rPr>
+              <a:t>uncomfortable  </a:t>
+            </a:r>
+            <a:r>
+              <a:rPr lang="en-US">
                 <a:solidFill>
-                  <a:schemeClr val="accent4"/>
+                  <a:srgbClr val="3A81BA"/>
                 </a:solidFill>
                 <a:latin typeface="Avenir Heavy"/>
                 <a:ea typeface="Avenir Heavy"/>
                 <a:cs typeface="Avenir Heavy"/>
-                <a:sym typeface="Avenir Heavy"/>
-              </a:defRPr>
-            </a:pPr>
-            <a:endParaRPr lang="en-US" dirty="0">
-              <a:solidFill>
-                <a:srgbClr val="3A81BA"/>
-              </a:solidFill>
-              <a:latin typeface="Avenir Heavy"/>
-              <a:ea typeface="Avenir Heavy"/>
-              <a:cs typeface="Avenir Heavy"/>
-              <a:sym typeface="Avenir Heavy"/>
-            </a:endParaRPr>
-          </a:p>
-          <a:p>
-            <a:pPr marL="742938" lvl="1" indent="-285750" hangingPunct="1">
-              <a:buFontTx/>
-              <a:buChar char="-"/>
-              <a:defRPr>
-                <a:solidFill>
-                  <a:schemeClr val="accent4"/>
-                </a:solidFill>
-                <a:latin typeface="Avenir Heavy"/>
-                <a:ea typeface="Avenir Heavy"/>
-                <a:cs typeface="Avenir Heavy"/>
-                <a:sym typeface="Avenir Heavy"/>
-              </a:defRPr>
-            </a:pPr>
+                <a:sym typeface="Wingdings" pitchFamily="2" charset="2"/>
+              </a:rPr>
+              <a:t></a:t>
+            </a:r>
             <a:endParaRPr lang="en-US" dirty="0">
               <a:solidFill>
                 <a:srgbClr val="3A81BA"/>

</xml_diff>

<commit_message>
fixes typos and changes code backgrounds to light
</commit_message>
<xml_diff>
--- a/ODD/materials/part0_intro.pptx
+++ b/ODD/materials/part0_intro.pptx
@@ -6786,7 +6786,7 @@
                 <a:cs typeface="Avenir Heavy"/>
                 <a:sym typeface="Avenir Heavy"/>
               </a:rPr>
-              <a:t>all instructions are tailored towards Unix (Linux / Mac), so try to make sure that at least one person is working on a Unix system</a:t>
+              <a:t>all instructions are tailored towards Unix (Linux / Mac) </a:t>
             </a:r>
           </a:p>
           <a:p>
@@ -6837,22 +6837,10 @@
                 <a:cs typeface="Avenir Heavy"/>
                 <a:sym typeface="Avenir Heavy"/>
               </a:rPr>
-              <a:t>, so one person writes, and one person looks over their shoulder. Feel free to switch, especially if it is </a:t>
-            </a:r>
-            <a:r>
-              <a:rPr lang="en-US">
-                <a:solidFill>
-                  <a:srgbClr val="3A81BA"/>
-                </a:solidFill>
-                <a:latin typeface="Avenir Heavy"/>
-                <a:ea typeface="Avenir Heavy"/>
-                <a:cs typeface="Avenir Heavy"/>
-                <a:sym typeface="Avenir Heavy"/>
-              </a:rPr>
-              <a:t>uncomfortable  </a:t>
-            </a:r>
-            <a:r>
-              <a:rPr lang="en-US">
+              <a:t>, so one person writes, and one person looks over their shoulder. Feel free to switch, especially if it is uncomfortable  </a:t>
+            </a:r>
+            <a:r>
+              <a:rPr lang="en-US" dirty="0">
                 <a:solidFill>
                   <a:srgbClr val="3A81BA"/>
                 </a:solidFill>
@@ -6863,6 +6851,21 @@
               </a:rPr>
               <a:t></a:t>
             </a:r>
+          </a:p>
+          <a:p>
+            <a:pPr marL="742938" lvl="1" indent="-285750" hangingPunct="1">
+              <a:buFontTx/>
+              <a:buChar char="-"/>
+              <a:defRPr>
+                <a:solidFill>
+                  <a:schemeClr val="accent4"/>
+                </a:solidFill>
+                <a:latin typeface="Avenir Heavy"/>
+                <a:ea typeface="Avenir Heavy"/>
+                <a:cs typeface="Avenir Heavy"/>
+                <a:sym typeface="Avenir Heavy"/>
+              </a:defRPr>
+            </a:pPr>
             <a:endParaRPr lang="en-US" dirty="0">
               <a:solidFill>
                 <a:srgbClr val="3A81BA"/>
@@ -6871,6 +6874,117 @@
               <a:ea typeface="Avenir Heavy"/>
               <a:cs typeface="Avenir Heavy"/>
               <a:sym typeface="Avenir Heavy"/>
+            </a:endParaRPr>
+          </a:p>
+          <a:p>
+            <a:pPr marL="285750" indent="-285750" hangingPunct="1">
+              <a:buFontTx/>
+              <a:buChar char="-"/>
+              <a:defRPr>
+                <a:solidFill>
+                  <a:schemeClr val="accent4"/>
+                </a:solidFill>
+                <a:latin typeface="Avenir Heavy"/>
+                <a:ea typeface="Avenir Heavy"/>
+                <a:cs typeface="Avenir Heavy"/>
+                <a:sym typeface="Avenir Heavy"/>
+              </a:defRPr>
+            </a:pPr>
+            <a:r>
+              <a:rPr lang="en-US" dirty="0">
+                <a:solidFill>
+                  <a:srgbClr val="3A81BA"/>
+                </a:solidFill>
+                <a:latin typeface="Avenir Heavy"/>
+                <a:ea typeface="Avenir Heavy"/>
+                <a:cs typeface="Avenir Heavy"/>
+                <a:sym typeface="Avenir Heavy"/>
+              </a:rPr>
+              <a:t>stickers</a:t>
+            </a:r>
+          </a:p>
+          <a:p>
+            <a:pPr marL="742938" lvl="1" indent="-285750" hangingPunct="1">
+              <a:buFontTx/>
+              <a:buChar char="-"/>
+              <a:defRPr>
+                <a:solidFill>
+                  <a:schemeClr val="accent4"/>
+                </a:solidFill>
+                <a:latin typeface="Avenir Heavy"/>
+                <a:ea typeface="Avenir Heavy"/>
+                <a:cs typeface="Avenir Heavy"/>
+                <a:sym typeface="Avenir Heavy"/>
+              </a:defRPr>
+            </a:pPr>
+            <a:r>
+              <a:rPr lang="en-US" dirty="0">
+                <a:solidFill>
+                  <a:srgbClr val="3A81BA"/>
+                </a:solidFill>
+                <a:latin typeface="Avenir Heavy"/>
+                <a:ea typeface="Avenir Heavy"/>
+                <a:cs typeface="Avenir Heavy"/>
+                <a:sym typeface="Avenir Heavy"/>
+              </a:rPr>
+              <a:t>put </a:t>
+            </a:r>
+            <a:r>
+              <a:rPr lang="en-US">
+                <a:solidFill>
+                  <a:srgbClr val="3A81BA"/>
+                </a:solidFill>
+                <a:latin typeface="Avenir Heavy"/>
+                <a:ea typeface="Avenir Heavy"/>
+                <a:cs typeface="Avenir Heavy"/>
+                <a:sym typeface="Avenir Heavy"/>
+              </a:rPr>
+              <a:t>up the green </a:t>
+            </a:r>
+            <a:r>
+              <a:rPr lang="en-US" dirty="0">
+                <a:solidFill>
+                  <a:srgbClr val="3A81BA"/>
+                </a:solidFill>
+                <a:latin typeface="Avenir Heavy"/>
+                <a:ea typeface="Avenir Heavy"/>
+                <a:cs typeface="Avenir Heavy"/>
+                <a:sym typeface="Avenir Heavy"/>
+              </a:rPr>
+              <a:t>sticker, </a:t>
+            </a:r>
+            <a:r>
+              <a:rPr lang="en-US">
+                <a:solidFill>
+                  <a:srgbClr val="3A81BA"/>
+                </a:solidFill>
+                <a:latin typeface="Avenir Heavy"/>
+                <a:ea typeface="Avenir Heavy"/>
+                <a:cs typeface="Avenir Heavy"/>
+                <a:sym typeface="Avenir Heavy"/>
+              </a:rPr>
+              <a:t>if you </a:t>
+            </a:r>
+            <a:r>
+              <a:rPr lang="en-US" dirty="0">
+                <a:solidFill>
+                  <a:srgbClr val="3A81BA"/>
+                </a:solidFill>
+                <a:latin typeface="Avenir Heavy"/>
+                <a:ea typeface="Avenir Heavy"/>
+                <a:cs typeface="Avenir Heavy"/>
+                <a:sym typeface="Avenir Heavy"/>
+              </a:rPr>
+              <a:t>are done with the main exercise. Keep working on the extra credit</a:t>
+            </a:r>
+            <a:endParaRPr lang="en-US" dirty="0">
+              <a:solidFill>
+                <a:srgbClr val="3A81BA"/>
+              </a:solidFill>
+              <a:latin typeface="Avenir Heavy"/>
+              <a:ea typeface="Avenir Heavy"/>
+              <a:cs typeface="Avenir Heavy"/>
+              <a:sym typeface="Wingdings" pitchFamily="2" charset="2"/>
             </a:endParaRPr>
           </a:p>
         </p:txBody>

</xml_diff>